<commit_message>
Update backlog, setup evironment
</commit_message>
<xml_diff>
--- a/Setup-Enviroment.pptx
+++ b/Setup-Enviroment.pptx
@@ -210,7 +210,7 @@
           <a:p>
             <a:fld id="{FBF01627-8FD9-46AC-86D1-AA11EABEF153}" type="datetimeFigureOut">
               <a:rPr lang="en-US" smtClean="0"/>
-              <a:t>5/13/2015</a:t>
+              <a:t>5/14/2015</a:t>
             </a:fld>
             <a:endParaRPr lang="en-US"/>
           </a:p>
@@ -827,7 +827,7 @@
           <a:p>
             <a:fld id="{591E3726-D1A1-40FF-B66C-9E650FD32486}" type="datetimeFigureOut">
               <a:rPr lang="en-US" smtClean="0"/>
-              <a:t>5/13/2015</a:t>
+              <a:t>5/14/2015</a:t>
             </a:fld>
             <a:endParaRPr lang="en-US"/>
           </a:p>
@@ -992,7 +992,7 @@
           <a:p>
             <a:fld id="{591E3726-D1A1-40FF-B66C-9E650FD32486}" type="datetimeFigureOut">
               <a:rPr lang="en-US" smtClean="0"/>
-              <a:t>5/13/2015</a:t>
+              <a:t>5/14/2015</a:t>
             </a:fld>
             <a:endParaRPr lang="en-US"/>
           </a:p>
@@ -1167,7 +1167,7 @@
           <a:p>
             <a:fld id="{591E3726-D1A1-40FF-B66C-9E650FD32486}" type="datetimeFigureOut">
               <a:rPr lang="en-US" smtClean="0"/>
-              <a:t>5/13/2015</a:t>
+              <a:t>5/14/2015</a:t>
             </a:fld>
             <a:endParaRPr lang="en-US"/>
           </a:p>
@@ -1332,7 +1332,7 @@
           <a:p>
             <a:fld id="{591E3726-D1A1-40FF-B66C-9E650FD32486}" type="datetimeFigureOut">
               <a:rPr lang="en-US" smtClean="0"/>
-              <a:t>5/13/2015</a:t>
+              <a:t>5/14/2015</a:t>
             </a:fld>
             <a:endParaRPr lang="en-US"/>
           </a:p>
@@ -1573,7 +1573,7 @@
           <a:p>
             <a:fld id="{591E3726-D1A1-40FF-B66C-9E650FD32486}" type="datetimeFigureOut">
               <a:rPr lang="en-US" smtClean="0"/>
-              <a:t>5/13/2015</a:t>
+              <a:t>5/14/2015</a:t>
             </a:fld>
             <a:endParaRPr lang="en-US"/>
           </a:p>
@@ -1856,7 +1856,7 @@
           <a:p>
             <a:fld id="{591E3726-D1A1-40FF-B66C-9E650FD32486}" type="datetimeFigureOut">
               <a:rPr lang="en-US" smtClean="0"/>
-              <a:t>5/13/2015</a:t>
+              <a:t>5/14/2015</a:t>
             </a:fld>
             <a:endParaRPr lang="en-US"/>
           </a:p>
@@ -2273,7 +2273,7 @@
           <a:p>
             <a:fld id="{591E3726-D1A1-40FF-B66C-9E650FD32486}" type="datetimeFigureOut">
               <a:rPr lang="en-US" smtClean="0"/>
-              <a:t>5/13/2015</a:t>
+              <a:t>5/14/2015</a:t>
             </a:fld>
             <a:endParaRPr lang="en-US"/>
           </a:p>
@@ -2386,7 +2386,7 @@
           <a:p>
             <a:fld id="{591E3726-D1A1-40FF-B66C-9E650FD32486}" type="datetimeFigureOut">
               <a:rPr lang="en-US" smtClean="0"/>
-              <a:t>5/13/2015</a:t>
+              <a:t>5/14/2015</a:t>
             </a:fld>
             <a:endParaRPr lang="en-US"/>
           </a:p>
@@ -2476,7 +2476,7 @@
           <a:p>
             <a:fld id="{591E3726-D1A1-40FF-B66C-9E650FD32486}" type="datetimeFigureOut">
               <a:rPr lang="en-US" smtClean="0"/>
-              <a:t>5/13/2015</a:t>
+              <a:t>5/14/2015</a:t>
             </a:fld>
             <a:endParaRPr lang="en-US"/>
           </a:p>
@@ -2748,7 +2748,7 @@
           <a:p>
             <a:fld id="{591E3726-D1A1-40FF-B66C-9E650FD32486}" type="datetimeFigureOut">
               <a:rPr lang="en-US" smtClean="0"/>
-              <a:t>5/13/2015</a:t>
+              <a:t>5/14/2015</a:t>
             </a:fld>
             <a:endParaRPr lang="en-US"/>
           </a:p>
@@ -2996,7 +2996,7 @@
           <a:p>
             <a:fld id="{591E3726-D1A1-40FF-B66C-9E650FD32486}" type="datetimeFigureOut">
               <a:rPr lang="en-US" smtClean="0"/>
-              <a:t>5/13/2015</a:t>
+              <a:t>5/14/2015</a:t>
             </a:fld>
             <a:endParaRPr lang="en-US"/>
           </a:p>
@@ -3204,7 +3204,7 @@
           <a:p>
             <a:fld id="{591E3726-D1A1-40FF-B66C-9E650FD32486}" type="datetimeFigureOut">
               <a:rPr lang="en-US" smtClean="0"/>
-              <a:t>5/13/2015</a:t>
+              <a:t>5/14/2015</a:t>
             </a:fld>
             <a:endParaRPr lang="en-US"/>
           </a:p>
@@ -3591,11 +3591,7 @@
           <a:p>
             <a:r>
               <a:rPr lang="en-US" dirty="0" smtClean="0"/>
-              <a:t>Setup </a:t>
-            </a:r>
-            <a:r>
-              <a:rPr lang="en-US" dirty="0" smtClean="0"/>
-              <a:t>Tutorial</a:t>
+              <a:t>Setup Tutorial</a:t>
             </a:r>
             <a:endParaRPr lang="en-US" dirty="0"/>
           </a:p>
@@ -3683,7 +3679,11 @@
           <a:bodyPr/>
           <a:lstStyle/>
           <a:p>
-            <a:endParaRPr lang="en-US"/>
+            <a:r>
+              <a:rPr lang="en-US" dirty="0" smtClean="0"/>
+              <a:t>Setup Tomcat</a:t>
+            </a:r>
+            <a:endParaRPr lang="en-US" dirty="0"/>
           </a:p>
         </p:txBody>
       </p:sp>
@@ -3750,7 +3750,11 @@
           <a:bodyPr/>
           <a:lstStyle/>
           <a:p>
-            <a:endParaRPr lang="en-US"/>
+            <a:r>
+              <a:rPr lang="en-US" dirty="0" smtClean="0"/>
+              <a:t>Setup Tomcat</a:t>
+            </a:r>
+            <a:endParaRPr lang="en-US" dirty="0"/>
           </a:p>
         </p:txBody>
       </p:sp>
@@ -3817,6 +3821,10 @@
           <a:bodyPr/>
           <a:lstStyle/>
           <a:p>
+            <a:r>
+              <a:rPr lang="en-US" dirty="0" smtClean="0"/>
+              <a:t>Setup Tomcat</a:t>
+            </a:r>
             <a:endParaRPr lang="en-US" dirty="0"/>
           </a:p>
         </p:txBody>
@@ -3839,7 +3847,7 @@
         </p:blipFill>
         <p:spPr>
           <a:xfrm>
-            <a:off x="762000" y="0"/>
+            <a:off x="838200" y="1600200"/>
             <a:ext cx="7168289" cy="4525963"/>
           </a:xfrm>
         </p:spPr>
@@ -3884,7 +3892,11 @@
           <a:bodyPr/>
           <a:lstStyle/>
           <a:p>
-            <a:endParaRPr lang="en-US"/>
+            <a:r>
+              <a:rPr lang="en-US" dirty="0" smtClean="0"/>
+              <a:t>Setup Tomcat</a:t>
+            </a:r>
+            <a:endParaRPr lang="en-US" dirty="0"/>
           </a:p>
         </p:txBody>
       </p:sp>
@@ -3906,7 +3918,7 @@
         </p:blipFill>
         <p:spPr>
           <a:xfrm>
-            <a:off x="533400" y="228600"/>
+            <a:off x="990600" y="1447800"/>
             <a:ext cx="7119789" cy="4525963"/>
           </a:xfrm>
         </p:spPr>
@@ -3919,7 +3931,7 @@
         </p:nvSpPr>
         <p:spPr>
           <a:xfrm>
-            <a:off x="609600" y="5105400"/>
+            <a:off x="533400" y="6096000"/>
             <a:ext cx="4572000" cy="646331"/>
           </a:xfrm>
           <a:prstGeom prst="rect">
@@ -3935,7 +3947,11 @@
           <a:p>
             <a:r>
               <a:rPr lang="en-US" dirty="0" smtClean="0"/>
-              <a:t>Select Tomcat Base Directory ( tomcat folder ) and  OK</a:t>
+              <a:t>Select Tomcat </a:t>
+            </a:r>
+            <a:r>
+              <a:rPr lang="en-US" dirty="0" smtClean="0"/>
+              <a:t>Base Directory ( tomcat folder ) and  OK</a:t>
             </a:r>
             <a:endParaRPr lang="en-US" dirty="0"/>
           </a:p>
@@ -3981,7 +3997,11 @@
           <a:bodyPr/>
           <a:lstStyle/>
           <a:p>
-            <a:endParaRPr lang="en-US"/>
+            <a:r>
+              <a:rPr lang="en-US" dirty="0" smtClean="0"/>
+              <a:t>Setup Tomcat</a:t>
+            </a:r>
+            <a:endParaRPr lang="en-US" dirty="0"/>
           </a:p>
         </p:txBody>
       </p:sp>
@@ -4003,7 +4023,7 @@
         </p:blipFill>
         <p:spPr>
           <a:xfrm>
-            <a:off x="457200" y="228600"/>
+            <a:off x="537949" y="1676400"/>
             <a:ext cx="8229600" cy="3256093"/>
           </a:xfrm>
         </p:spPr>
@@ -4016,7 +4036,7 @@
         </p:nvSpPr>
         <p:spPr>
           <a:xfrm>
-            <a:off x="533400" y="3733800"/>
+            <a:off x="537949" y="5410200"/>
             <a:ext cx="4343400" cy="646331"/>
           </a:xfrm>
           <a:prstGeom prst="rect">
@@ -4078,7 +4098,11 @@
           <a:bodyPr/>
           <a:lstStyle/>
           <a:p>
-            <a:endParaRPr lang="en-US"/>
+            <a:r>
+              <a:rPr lang="en-US" dirty="0" smtClean="0"/>
+              <a:t>Setup Tomcat</a:t>
+            </a:r>
+            <a:endParaRPr lang="en-US" dirty="0"/>
           </a:p>
         </p:txBody>
       </p:sp>
@@ -4185,13 +4209,7 @@
               <a:rPr lang="en-US" sz="2400" dirty="0" smtClean="0">
                 <a:hlinkClick r:id="rId2"/>
               </a:rPr>
-              <a:t>http</a:t>
-            </a:r>
-            <a:r>
-              <a:rPr lang="en-US" sz="2400" dirty="0" smtClean="0">
-                <a:hlinkClick r:id="rId2"/>
-              </a:rPr>
-              <a:t>://dev.mysql.com/downloads/mysql/</a:t>
+              <a:t>http://dev.mysql.com/downloads/mysql/</a:t>
             </a:r>
             <a:endParaRPr lang="en-US" sz="2400" dirty="0" smtClean="0"/>
           </a:p>
@@ -4215,13 +4233,7 @@
               <a:rPr lang="en-US" sz="2400" dirty="0" smtClean="0">
                 <a:hlinkClick r:id="rId3"/>
               </a:rPr>
-              <a:t>http</a:t>
-            </a:r>
-            <a:r>
-              <a:rPr lang="en-US" sz="2400" dirty="0" smtClean="0">
-                <a:hlinkClick r:id="rId3"/>
-              </a:rPr>
-              <a:t>://dev.mysql.com/downloads/workbench/</a:t>
+              <a:t>http://dev.mysql.com/downloads/workbench/</a:t>
             </a:r>
             <a:endParaRPr lang="en-US" sz="2400" dirty="0"/>
           </a:p>
@@ -4276,7 +4288,11 @@
           <a:bodyPr/>
           <a:lstStyle/>
           <a:p>
-            <a:endParaRPr lang="en-US"/>
+            <a:r>
+              <a:rPr lang="en-US" dirty="0" smtClean="0"/>
+              <a:t>Import Database</a:t>
+            </a:r>
+            <a:endParaRPr lang="en-US" dirty="0"/>
           </a:p>
         </p:txBody>
       </p:sp>
@@ -4349,7 +4365,11 @@
           <a:bodyPr/>
           <a:lstStyle/>
           <a:p>
-            <a:endParaRPr lang="en-US"/>
+            <a:r>
+              <a:rPr lang="en-US" dirty="0" smtClean="0"/>
+              <a:t>Import Database</a:t>
+            </a:r>
+            <a:endParaRPr lang="en-US" dirty="0"/>
           </a:p>
         </p:txBody>
       </p:sp>
@@ -4434,7 +4454,12 @@
             <p:ph idx="1"/>
           </p:nvPr>
         </p:nvSpPr>
-        <p:spPr/>
+        <p:spPr>
+          <a:xfrm>
+            <a:off x="381000" y="1524000"/>
+            <a:ext cx="8229600" cy="4525963"/>
+          </a:xfrm>
+        </p:spPr>
         <p:txBody>
           <a:bodyPr>
             <a:normAutofit/>
@@ -4550,44 +4575,25 @@
           <a:p>
             <a:r>
               <a:rPr lang="en-US" dirty="0" smtClean="0"/>
-              <a:t>Setup Java </a:t>
-            </a:r>
+              <a:t>Setup Java environment (version 7u79)</a:t>
+            </a:r>
+          </a:p>
+          <a:p>
             <a:r>
               <a:rPr lang="en-US" dirty="0" smtClean="0"/>
-              <a:t>environment (version 7u79)</a:t>
-            </a:r>
-            <a:endParaRPr lang="en-US" dirty="0" smtClean="0"/>
+              <a:t>Setup maven environment (version 3.3.3)</a:t>
+            </a:r>
           </a:p>
           <a:p>
             <a:r>
               <a:rPr lang="en-US" dirty="0" smtClean="0"/>
-              <a:t>Setup maven </a:t>
-            </a:r>
+              <a:t>Setup Intellij (version 13.1.6)</a:t>
+            </a:r>
+          </a:p>
+          <a:p>
             <a:r>
               <a:rPr lang="en-US" dirty="0" smtClean="0"/>
-              <a:t>environment (version 3.3.3)</a:t>
-            </a:r>
-            <a:endParaRPr lang="en-US" dirty="0" smtClean="0"/>
-          </a:p>
-          <a:p>
-            <a:r>
-              <a:rPr lang="en-US" dirty="0" smtClean="0"/>
-              <a:t>Setup </a:t>
-            </a:r>
-            <a:r>
-              <a:rPr lang="en-US" dirty="0" smtClean="0"/>
-              <a:t>Intellij (version 13.1.6)</a:t>
-            </a:r>
-            <a:endParaRPr lang="en-US" dirty="0" smtClean="0"/>
-          </a:p>
-          <a:p>
-            <a:r>
-              <a:rPr lang="en-US" dirty="0" smtClean="0"/>
-              <a:t>Setup </a:t>
-            </a:r>
-            <a:r>
-              <a:rPr lang="en-US" dirty="0" smtClean="0"/>
-              <a:t>Tomcat7 (version 7.0.61)</a:t>
+              <a:t>Setup Tomcat7 (version 7.0.61)</a:t>
             </a:r>
           </a:p>
           <a:p>
@@ -4611,7 +4617,6 @@
               <a:rPr lang="en-US" dirty="0" smtClean="0"/>
               <a:t>Workbench (version 6.3.3)</a:t>
             </a:r>
-            <a:endParaRPr lang="en-US" dirty="0" smtClean="0"/>
           </a:p>
           <a:p>
             <a:r>
@@ -4664,11 +4669,7 @@
           <a:p>
             <a:r>
               <a:rPr lang="en-US" dirty="0" smtClean="0"/>
-              <a:t>Setup Java </a:t>
-            </a:r>
-            <a:r>
-              <a:rPr lang="en-US" dirty="0" smtClean="0"/>
-              <a:t>environment</a:t>
+              <a:t>Setup Java environment</a:t>
             </a:r>
             <a:endParaRPr lang="en-US" dirty="0"/>
           </a:p>
@@ -4755,7 +4756,6 @@
               <a:rPr lang="en-US" sz="2400" dirty="0" smtClean="0"/>
               <a:t>.</a:t>
             </a:r>
-            <a:endParaRPr lang="en-US" sz="2400" dirty="0" smtClean="0"/>
           </a:p>
           <a:p>
             <a:pPr>
@@ -4767,13 +4767,8 @@
             </a:r>
             <a:r>
               <a:rPr lang="en-US" sz="2400" dirty="0" smtClean="0"/>
-              <a:t>open </a:t>
-            </a:r>
-            <a:r>
-              <a:rPr lang="en-US" sz="2400" dirty="0" smtClean="0"/>
-              <a:t>cmd:</a:t>
-            </a:r>
-            <a:endParaRPr lang="en-US" sz="2400" dirty="0" smtClean="0"/>
+              <a:t>open cmd:</a:t>
+            </a:r>
           </a:p>
           <a:p>
             <a:pPr>
@@ -4906,11 +4901,7 @@
           <a:p>
             <a:r>
               <a:rPr lang="en-US" dirty="0" smtClean="0"/>
-              <a:t>Setup Maven </a:t>
-            </a:r>
-            <a:r>
-              <a:rPr lang="en-US" dirty="0" smtClean="0"/>
-              <a:t>environment</a:t>
+              <a:t>Setup Maven environment</a:t>
             </a:r>
             <a:endParaRPr lang="en-US" dirty="0"/>
           </a:p>
@@ -4964,7 +4955,6 @@
               <a:rPr lang="en-US" sz="2400" dirty="0" smtClean="0"/>
               <a:t>.</a:t>
             </a:r>
-            <a:endParaRPr lang="en-US" sz="2400" dirty="0" smtClean="0"/>
           </a:p>
           <a:p>
             <a:r>
@@ -4979,7 +4969,6 @@
               <a:rPr lang="en-US" sz="2400" dirty="0" smtClean="0"/>
               <a:t>Security\System\ Advance System Setting\ Environment Variable</a:t>
             </a:r>
-            <a:endParaRPr lang="en-US" sz="2400" dirty="0" smtClean="0"/>
           </a:p>
         </p:txBody>
       </p:sp>
@@ -5027,7 +5016,6 @@
               <a:rPr lang="en-US" dirty="0"/>
               <a:t>Setup Maven environment</a:t>
             </a:r>
-            <a:endParaRPr lang="en-US" dirty="0"/>
           </a:p>
         </p:txBody>
       </p:sp>
@@ -5076,15 +5064,7 @@
             </a:r>
             <a:r>
               <a:rPr lang="en-US" sz="2400" dirty="0" smtClean="0"/>
-              <a:t>C:\..\</a:t>
-            </a:r>
-            <a:r>
-              <a:rPr lang="en-US" sz="2400" dirty="0" smtClean="0"/>
-              <a:t>maven_folder_path\bin</a:t>
-            </a:r>
-            <a:r>
-              <a:rPr lang="en-US" sz="2400" dirty="0" smtClean="0"/>
-              <a:t>.</a:t>
+              <a:t>C:\..\maven_folder_path\bin.</a:t>
             </a:r>
           </a:p>
           <a:p>
@@ -5214,15 +5194,7 @@
           <a:p>
             <a:r>
               <a:rPr lang="en-US" sz="2400" dirty="0" smtClean="0"/>
-              <a:t>Download </a:t>
-            </a:r>
-            <a:r>
-              <a:rPr lang="en-US" sz="2400" dirty="0" smtClean="0"/>
-              <a:t>Intellij</a:t>
-            </a:r>
-            <a:r>
-              <a:rPr lang="en-US" sz="2400" dirty="0" smtClean="0"/>
-              <a:t/>
+              <a:t>Download Intellij</a:t>
             </a:r>
             <a:br>
               <a:rPr lang="en-US" sz="2400" dirty="0" smtClean="0"/>
@@ -5416,13 +5388,7 @@
               <a:rPr lang="en-US" dirty="0" smtClean="0">
                 <a:hlinkClick r:id="rId2"/>
               </a:rPr>
-              <a:t>http</a:t>
-            </a:r>
-            <a:r>
-              <a:rPr lang="en-US" dirty="0" smtClean="0">
-                <a:hlinkClick r:id="rId2"/>
-              </a:rPr>
-              <a:t>://tomcat.apache.org/download-70.cgi</a:t>
+              <a:t>http://tomcat.apache.org/download-70.cgi</a:t>
             </a:r>
             <a:endParaRPr lang="en-US" dirty="0" smtClean="0"/>
           </a:p>
@@ -5431,7 +5397,6 @@
               <a:rPr lang="en-US" dirty="0" smtClean="0"/>
               <a:t>Unzip the archive</a:t>
             </a:r>
-            <a:endParaRPr lang="en-US" dirty="0" smtClean="0"/>
           </a:p>
           <a:p>
             <a:pPr marL="0" indent="0">
@@ -5481,6 +5446,10 @@
           <a:bodyPr/>
           <a:lstStyle/>
           <a:p>
+            <a:r>
+              <a:rPr lang="en-US" dirty="0" smtClean="0"/>
+              <a:t>Setup Tomcat</a:t>
+            </a:r>
             <a:endParaRPr lang="en-US" dirty="0"/>
           </a:p>
         </p:txBody>

</xml_diff>